<commit_message>
H1 af (op filmpjes na)
</commit_message>
<xml_diff>
--- a/Architectuur (HTML)/images.pptx
+++ b/Architectuur (HTML)/images.pptx
@@ -5,10 +5,11 @@
     <p:sldMasterId id="2147483648" r:id="rId1"/>
   </p:sldMasterIdLst>
   <p:notesMasterIdLst>
-    <p:notesMasterId r:id="rId3"/>
+    <p:notesMasterId r:id="rId4"/>
   </p:notesMasterIdLst>
   <p:sldIdLst>
     <p:sldId id="256" r:id="rId2"/>
+    <p:sldId id="257" r:id="rId3"/>
   </p:sldIdLst>
   <p:sldSz cx="12192000" cy="6858000"/>
   <p:notesSz cx="6858000" cy="9144000"/>
@@ -107,6 +108,11 @@
       </a:defRPr>
     </a:lvl9pPr>
   </p:defaultTextStyle>
+  <p:extLst>
+    <p:ext uri="{EFAFB233-063F-42B5-8137-9DF3F51BA10A}">
+      <p15:sldGuideLst xmlns:p15="http://schemas.microsoft.com/office/powerpoint/2012/main"/>
+    </p:ext>
+  </p:extLst>
 </p:presentation>
 </file>
 
@@ -219,6 +225,35 @@
 </pc:chgInfo>
 </file>
 
+<file path=ppt/ink/ink1.xml><?xml version="1.0" encoding="utf-8"?>
+<inkml:ink xmlns:inkml="http://www.w3.org/2003/InkML">
+  <inkml:definitions>
+    <inkml:context xml:id="ctx0">
+      <inkml:inkSource xml:id="inkSrc0">
+        <inkml:traceFormat>
+          <inkml:channel name="X" type="integer" min="-2.14748E9" max="2.14748E9" units="cm"/>
+          <inkml:channel name="Y" type="integer" min="-2.14748E9" max="2.14748E9" units="cm"/>
+        </inkml:traceFormat>
+        <inkml:channelProperties>
+          <inkml:channelProperty channel="X" name="resolution" value="1000" units="1/cm"/>
+          <inkml:channelProperty channel="Y" name="resolution" value="1000" units="1/cm"/>
+        </inkml:channelProperties>
+      </inkml:inkSource>
+      <inkml:timestamp xml:id="ts0" timeString="2024-05-20T15:29:32.866"/>
+    </inkml:context>
+    <inkml:brush xml:id="br0">
+      <inkml:brushProperty name="width" value="0.3" units="cm"/>
+      <inkml:brushProperty name="height" value="0.6" units="cm"/>
+      <inkml:brushProperty name="color" value="#FFFC00"/>
+      <inkml:brushProperty name="tip" value="rectangle"/>
+      <inkml:brushProperty name="rasterOp" value="maskPen"/>
+      <inkml:brushProperty name="ignorePressure" value="1"/>
+    </inkml:brush>
+  </inkml:definitions>
+  <inkml:trace contextRef="#ctx0" brushRef="#br0">1 57,'2827'0,"-2666"-14,-10 1,-142 12,46 1,100-15,-90 7,1 3,116 5,-64 2,1065-2,-1160 0</inkml:trace>
+</inkml:ink>
+</file>
+
 <file path=ppt/notesMasters/notesMaster1.xml><?xml version="1.0" encoding="utf-8"?>
 <p:notesMaster xmlns:a="http://schemas.openxmlformats.org/drawingml/2006/main" xmlns:r="http://schemas.openxmlformats.org/officeDocument/2006/relationships" xmlns:p="http://schemas.openxmlformats.org/presentationml/2006/main">
   <p:cSld>
@@ -301,7 +336,7 @@
           <a:p>
             <a:fld id="{1C0D9DC7-A010-4913-9ACE-82D4F5A986B2}" type="datetimeFigureOut">
               <a:rPr lang="nl-NL" smtClean="0"/>
-              <a:t>19-5-2024</a:t>
+              <a:t>20-5-2024</a:t>
             </a:fld>
             <a:endParaRPr lang="nl-NL"/>
           </a:p>
@@ -803,7 +838,7 @@
           <a:p>
             <a:fld id="{6B155A0B-ACDE-41EE-A104-BB8C9D367895}" type="datetimeFigureOut">
               <a:rPr lang="nl-NL" smtClean="0"/>
-              <a:t>19-5-2024</a:t>
+              <a:t>20-5-2024</a:t>
             </a:fld>
             <a:endParaRPr lang="nl-NL"/>
           </a:p>
@@ -1001,7 +1036,7 @@
           <a:p>
             <a:fld id="{6B155A0B-ACDE-41EE-A104-BB8C9D367895}" type="datetimeFigureOut">
               <a:rPr lang="nl-NL" smtClean="0"/>
-              <a:t>19-5-2024</a:t>
+              <a:t>20-5-2024</a:t>
             </a:fld>
             <a:endParaRPr lang="nl-NL"/>
           </a:p>
@@ -1209,7 +1244,7 @@
           <a:p>
             <a:fld id="{6B155A0B-ACDE-41EE-A104-BB8C9D367895}" type="datetimeFigureOut">
               <a:rPr lang="nl-NL" smtClean="0"/>
-              <a:t>19-5-2024</a:t>
+              <a:t>20-5-2024</a:t>
             </a:fld>
             <a:endParaRPr lang="nl-NL"/>
           </a:p>
@@ -1407,7 +1442,7 @@
           <a:p>
             <a:fld id="{6B155A0B-ACDE-41EE-A104-BB8C9D367895}" type="datetimeFigureOut">
               <a:rPr lang="nl-NL" smtClean="0"/>
-              <a:t>19-5-2024</a:t>
+              <a:t>20-5-2024</a:t>
             </a:fld>
             <a:endParaRPr lang="nl-NL"/>
           </a:p>
@@ -1682,7 +1717,7 @@
           <a:p>
             <a:fld id="{6B155A0B-ACDE-41EE-A104-BB8C9D367895}" type="datetimeFigureOut">
               <a:rPr lang="nl-NL" smtClean="0"/>
-              <a:t>19-5-2024</a:t>
+              <a:t>20-5-2024</a:t>
             </a:fld>
             <a:endParaRPr lang="nl-NL"/>
           </a:p>
@@ -1947,7 +1982,7 @@
           <a:p>
             <a:fld id="{6B155A0B-ACDE-41EE-A104-BB8C9D367895}" type="datetimeFigureOut">
               <a:rPr lang="nl-NL" smtClean="0"/>
-              <a:t>19-5-2024</a:t>
+              <a:t>20-5-2024</a:t>
             </a:fld>
             <a:endParaRPr lang="nl-NL"/>
           </a:p>
@@ -2359,7 +2394,7 @@
           <a:p>
             <a:fld id="{6B155A0B-ACDE-41EE-A104-BB8C9D367895}" type="datetimeFigureOut">
               <a:rPr lang="nl-NL" smtClean="0"/>
-              <a:t>19-5-2024</a:t>
+              <a:t>20-5-2024</a:t>
             </a:fld>
             <a:endParaRPr lang="nl-NL"/>
           </a:p>
@@ -2500,7 +2535,7 @@
           <a:p>
             <a:fld id="{6B155A0B-ACDE-41EE-A104-BB8C9D367895}" type="datetimeFigureOut">
               <a:rPr lang="nl-NL" smtClean="0"/>
-              <a:t>19-5-2024</a:t>
+              <a:t>20-5-2024</a:t>
             </a:fld>
             <a:endParaRPr lang="nl-NL"/>
           </a:p>
@@ -2613,7 +2648,7 @@
           <a:p>
             <a:fld id="{6B155A0B-ACDE-41EE-A104-BB8C9D367895}" type="datetimeFigureOut">
               <a:rPr lang="nl-NL" smtClean="0"/>
-              <a:t>19-5-2024</a:t>
+              <a:t>20-5-2024</a:t>
             </a:fld>
             <a:endParaRPr lang="nl-NL"/>
           </a:p>
@@ -2924,7 +2959,7 @@
           <a:p>
             <a:fld id="{6B155A0B-ACDE-41EE-A104-BB8C9D367895}" type="datetimeFigureOut">
               <a:rPr lang="nl-NL" smtClean="0"/>
-              <a:t>19-5-2024</a:t>
+              <a:t>20-5-2024</a:t>
             </a:fld>
             <a:endParaRPr lang="nl-NL"/>
           </a:p>
@@ -3212,7 +3247,7 @@
           <a:p>
             <a:fld id="{6B155A0B-ACDE-41EE-A104-BB8C9D367895}" type="datetimeFigureOut">
               <a:rPr lang="nl-NL" smtClean="0"/>
-              <a:t>19-5-2024</a:t>
+              <a:t>20-5-2024</a:t>
             </a:fld>
             <a:endParaRPr lang="nl-NL"/>
           </a:p>
@@ -3453,7 +3488,7 @@
           <a:p>
             <a:fld id="{6B155A0B-ACDE-41EE-A104-BB8C9D367895}" type="datetimeFigureOut">
               <a:rPr lang="nl-NL" smtClean="0"/>
-              <a:t>19-5-2024</a:t>
+              <a:t>20-5-2024</a:t>
             </a:fld>
             <a:endParaRPr lang="nl-NL"/>
           </a:p>
@@ -4242,6 +4277,167 @@
     <p:extLst>
       <p:ext uri="{BB962C8B-B14F-4D97-AF65-F5344CB8AC3E}">
         <p14:creationId xmlns:p14="http://schemas.microsoft.com/office/powerpoint/2010/main" val="2649266779"/>
+      </p:ext>
+    </p:extLst>
+  </p:cSld>
+  <p:clrMapOvr>
+    <a:masterClrMapping/>
+  </p:clrMapOvr>
+</p:sld>
+</file>
+
+<file path=ppt/slides/slide2.xml><?xml version="1.0" encoding="utf-8"?>
+<p:sld xmlns:a="http://schemas.openxmlformats.org/drawingml/2006/main" xmlns:r="http://schemas.openxmlformats.org/officeDocument/2006/relationships" xmlns:p="http://schemas.openxmlformats.org/presentationml/2006/main">
+  <p:cSld>
+    <p:spTree>
+      <p:nvGrpSpPr>
+        <p:cNvPr id="1" name=""/>
+        <p:cNvGrpSpPr/>
+        <p:nvPr/>
+      </p:nvGrpSpPr>
+      <p:grpSpPr>
+        <a:xfrm>
+          <a:off x="0" y="0"/>
+          <a:ext cx="0" cy="0"/>
+          <a:chOff x="0" y="0"/>
+          <a:chExt cx="0" cy="0"/>
+        </a:xfrm>
+      </p:grpSpPr>
+      <p:sp>
+        <p:nvSpPr>
+          <p:cNvPr id="2" name="Titel 1">
+            <a:extLst>
+              <a:ext uri="{FF2B5EF4-FFF2-40B4-BE49-F238E27FC236}">
+                <a16:creationId xmlns:a16="http://schemas.microsoft.com/office/drawing/2014/main" id="{F687A6F5-322B-1A04-8C7A-8F7D4258C661}"/>
+              </a:ext>
+            </a:extLst>
+          </p:cNvPr>
+          <p:cNvSpPr>
+            <a:spLocks noGrp="1"/>
+          </p:cNvSpPr>
+          <p:nvPr>
+            <p:ph type="title"/>
+          </p:nvPr>
+        </p:nvSpPr>
+        <p:spPr/>
+        <p:txBody>
+          <a:bodyPr/>
+          <a:lstStyle/>
+          <a:p>
+            <a:endParaRPr lang="nl-NL"/>
+          </a:p>
+        </p:txBody>
+      </p:sp>
+      <p:sp>
+        <p:nvSpPr>
+          <p:cNvPr id="3" name="Tijdelijke aanduiding voor inhoud 2">
+            <a:extLst>
+              <a:ext uri="{FF2B5EF4-FFF2-40B4-BE49-F238E27FC236}">
+                <a16:creationId xmlns:a16="http://schemas.microsoft.com/office/drawing/2014/main" id="{9E56F6D7-63B4-706D-ACB3-69FD4C410770}"/>
+              </a:ext>
+            </a:extLst>
+          </p:cNvPr>
+          <p:cNvSpPr>
+            <a:spLocks noGrp="1"/>
+          </p:cNvSpPr>
+          <p:nvPr>
+            <p:ph idx="1"/>
+          </p:nvPr>
+        </p:nvSpPr>
+        <p:spPr/>
+        <p:txBody>
+          <a:bodyPr/>
+          <a:lstStyle/>
+          <a:p>
+            <a:endParaRPr lang="nl-NL"/>
+          </a:p>
+        </p:txBody>
+      </p:sp>
+      <p:pic>
+        <p:nvPicPr>
+          <p:cNvPr id="5" name="Afbeelding 4">
+            <a:extLst>
+              <a:ext uri="{FF2B5EF4-FFF2-40B4-BE49-F238E27FC236}">
+                <a16:creationId xmlns:a16="http://schemas.microsoft.com/office/drawing/2014/main" id="{C72311E4-EE5C-2143-EFED-58D566A004DA}"/>
+              </a:ext>
+            </a:extLst>
+          </p:cNvPr>
+          <p:cNvPicPr>
+            <a:picLocks noChangeAspect="1"/>
+          </p:cNvPicPr>
+          <p:nvPr/>
+        </p:nvPicPr>
+        <p:blipFill>
+          <a:blip r:embed="rId2"/>
+          <a:stretch>
+            <a:fillRect/>
+          </a:stretch>
+        </p:blipFill>
+        <p:spPr>
+          <a:xfrm>
+            <a:off x="3662362" y="2781300"/>
+            <a:ext cx="4867275" cy="1295400"/>
+          </a:xfrm>
+          <a:prstGeom prst="rect">
+            <a:avLst/>
+          </a:prstGeom>
+        </p:spPr>
+      </p:pic>
+      <mc:AlternateContent xmlns:mc="http://schemas.openxmlformats.org/markup-compatibility/2006">
+        <mc:Choice xmlns:p14="http://schemas.microsoft.com/office/powerpoint/2010/main" Requires="p14">
+          <p:contentPart p14:bwMode="auto" r:id="rId3">
+            <p14:nvContentPartPr>
+              <p14:cNvPr id="6" name="Inkt 5">
+                <a:extLst>
+                  <a:ext uri="{FF2B5EF4-FFF2-40B4-BE49-F238E27FC236}">
+                    <a16:creationId xmlns:a16="http://schemas.microsoft.com/office/drawing/2014/main" id="{D4A0365D-544F-5E6C-62B7-89ED11916D8B}"/>
+                  </a:ext>
+                </a:extLst>
+              </p14:cNvPr>
+              <p14:cNvContentPartPr/>
+              <p14:nvPr/>
+            </p14:nvContentPartPr>
+            <p14:xfrm>
+              <a:off x="3842119" y="3247736"/>
+              <a:ext cx="1798560" cy="20880"/>
+            </p14:xfrm>
+          </p:contentPart>
+        </mc:Choice>
+        <mc:Fallback>
+          <p:pic>
+            <p:nvPicPr>
+              <p:cNvPr id="6" name="Inkt 5">
+                <a:extLst>
+                  <a:ext uri="{FF2B5EF4-FFF2-40B4-BE49-F238E27FC236}">
+                    <a16:creationId xmlns:a16="http://schemas.microsoft.com/office/drawing/2014/main" id="{D4A0365D-544F-5E6C-62B7-89ED11916D8B}"/>
+                  </a:ext>
+                </a:extLst>
+              </p:cNvPr>
+              <p:cNvPicPr/>
+              <p:nvPr/>
+            </p:nvPicPr>
+            <p:blipFill>
+              <a:blip r:embed="rId4"/>
+              <a:stretch>
+                <a:fillRect/>
+              </a:stretch>
+            </p:blipFill>
+            <p:spPr>
+              <a:xfrm>
+                <a:off x="3788479" y="3140096"/>
+                <a:ext cx="1906200" cy="236520"/>
+              </a:xfrm>
+              <a:prstGeom prst="rect">
+                <a:avLst/>
+              </a:prstGeom>
+            </p:spPr>
+          </p:pic>
+        </mc:Fallback>
+      </mc:AlternateContent>
+    </p:spTree>
+    <p:extLst>
+      <p:ext uri="{BB962C8B-B14F-4D97-AF65-F5344CB8AC3E}">
+        <p14:creationId xmlns:p14="http://schemas.microsoft.com/office/powerpoint/2010/main" val="2318766181"/>
       </p:ext>
     </p:extLst>
   </p:cSld>

</xml_diff>